<commit_message>
Last Update 05-10-2018 12:09:40.21
</commit_message>
<xml_diff>
--- a/Slides/Unit 2/GE8151-U2-2-Operators.pptx
+++ b/Slides/Unit 2/GE8151-U2-2-Operators.pptx
@@ -5,14 +5,15 @@
     <p:sldMasterId id="2147483648" r:id="rId1"/>
   </p:sldMasterIdLst>
   <p:notesMasterIdLst>
-    <p:notesMasterId r:id="rId7"/>
+    <p:notesMasterId r:id="rId8"/>
   </p:notesMasterIdLst>
   <p:sldIdLst>
     <p:sldId id="256" r:id="rId2"/>
     <p:sldId id="274" r:id="rId3"/>
     <p:sldId id="275" r:id="rId4"/>
     <p:sldId id="276" r:id="rId5"/>
-    <p:sldId id="272" r:id="rId6"/>
+    <p:sldId id="277" r:id="rId6"/>
+    <p:sldId id="272" r:id="rId7"/>
   </p:sldIdLst>
   <p:sldSz cx="9144000" cy="6858000" type="screen4x3"/>
   <p:notesSz cx="6858000" cy="9144000"/>
@@ -197,7 +198,7 @@
             <a:fld id="{9515075B-F3F0-4441-A1BD-B7B515B708FF}" type="datetimeFigureOut">
               <a:rPr lang="en-US" smtClean="0"/>
               <a:pPr/>
-              <a:t>10/4/2018</a:t>
+              <a:t>10/5/2018</a:t>
             </a:fld>
             <a:endParaRPr lang="en-US"/>
           </a:p>
@@ -664,7 +665,7 @@
             <a:fld id="{6E658DF8-B8C0-4C7F-85EB-B53A2DDD44A9}" type="datetimeFigureOut">
               <a:rPr lang="en-US" smtClean="0"/>
               <a:pPr/>
-              <a:t>10/4/2018</a:t>
+              <a:t>10/5/2018</a:t>
             </a:fld>
             <a:endParaRPr lang="en-US"/>
           </a:p>
@@ -831,7 +832,7 @@
             <a:fld id="{6E658DF8-B8C0-4C7F-85EB-B53A2DDD44A9}" type="datetimeFigureOut">
               <a:rPr lang="en-US" smtClean="0"/>
               <a:pPr/>
-              <a:t>10/4/2018</a:t>
+              <a:t>10/5/2018</a:t>
             </a:fld>
             <a:endParaRPr lang="en-US"/>
           </a:p>
@@ -1008,7 +1009,7 @@
             <a:fld id="{6E658DF8-B8C0-4C7F-85EB-B53A2DDD44A9}" type="datetimeFigureOut">
               <a:rPr lang="en-US" smtClean="0"/>
               <a:pPr/>
-              <a:t>10/4/2018</a:t>
+              <a:t>10/5/2018</a:t>
             </a:fld>
             <a:endParaRPr lang="en-US"/>
           </a:p>
@@ -1207,7 +1208,7 @@
             <a:fld id="{6E658DF8-B8C0-4C7F-85EB-B53A2DDD44A9}" type="datetimeFigureOut">
               <a:rPr lang="en-US" smtClean="0"/>
               <a:pPr/>
-              <a:t>10/4/2018</a:t>
+              <a:t>10/5/2018</a:t>
             </a:fld>
             <a:endParaRPr lang="en-US"/>
           </a:p>
@@ -1450,7 +1451,7 @@
             <a:fld id="{6E658DF8-B8C0-4C7F-85EB-B53A2DDD44A9}" type="datetimeFigureOut">
               <a:rPr lang="en-US" smtClean="0"/>
               <a:pPr/>
-              <a:t>10/4/2018</a:t>
+              <a:t>10/5/2018</a:t>
             </a:fld>
             <a:endParaRPr lang="en-US"/>
           </a:p>
@@ -1735,7 +1736,7 @@
             <a:fld id="{6E658DF8-B8C0-4C7F-85EB-B53A2DDD44A9}" type="datetimeFigureOut">
               <a:rPr lang="en-US" smtClean="0"/>
               <a:pPr/>
-              <a:t>10/4/2018</a:t>
+              <a:t>10/5/2018</a:t>
             </a:fld>
             <a:endParaRPr lang="en-US"/>
           </a:p>
@@ -2154,7 +2155,7 @@
             <a:fld id="{6E658DF8-B8C0-4C7F-85EB-B53A2DDD44A9}" type="datetimeFigureOut">
               <a:rPr lang="en-US" smtClean="0"/>
               <a:pPr/>
-              <a:t>10/4/2018</a:t>
+              <a:t>10/5/2018</a:t>
             </a:fld>
             <a:endParaRPr lang="en-US"/>
           </a:p>
@@ -2269,7 +2270,7 @@
             <a:fld id="{6E658DF8-B8C0-4C7F-85EB-B53A2DDD44A9}" type="datetimeFigureOut">
               <a:rPr lang="en-US" smtClean="0"/>
               <a:pPr/>
-              <a:t>10/4/2018</a:t>
+              <a:t>10/5/2018</a:t>
             </a:fld>
             <a:endParaRPr lang="en-US"/>
           </a:p>
@@ -2361,7 +2362,7 @@
             <a:fld id="{6E658DF8-B8C0-4C7F-85EB-B53A2DDD44A9}" type="datetimeFigureOut">
               <a:rPr lang="en-US" smtClean="0"/>
               <a:pPr/>
-              <a:t>10/4/2018</a:t>
+              <a:t>10/5/2018</a:t>
             </a:fld>
             <a:endParaRPr lang="en-US"/>
           </a:p>
@@ -2635,7 +2636,7 @@
             <a:fld id="{6E658DF8-B8C0-4C7F-85EB-B53A2DDD44A9}" type="datetimeFigureOut">
               <a:rPr lang="en-US" smtClean="0"/>
               <a:pPr/>
-              <a:t>10/4/2018</a:t>
+              <a:t>10/5/2018</a:t>
             </a:fld>
             <a:endParaRPr lang="en-US"/>
           </a:p>
@@ -2889,7 +2890,7 @@
             <a:fld id="{6E658DF8-B8C0-4C7F-85EB-B53A2DDD44A9}" type="datetimeFigureOut">
               <a:rPr lang="en-US" smtClean="0"/>
               <a:pPr/>
-              <a:t>10/4/2018</a:t>
+              <a:t>10/5/2018</a:t>
             </a:fld>
             <a:endParaRPr lang="en-US"/>
           </a:p>
@@ -3111,7 +3112,7 @@
             <a:fld id="{6E658DF8-B8C0-4C7F-85EB-B53A2DDD44A9}" type="datetimeFigureOut">
               <a:rPr lang="en-US" smtClean="0"/>
               <a:pPr/>
-              <a:t>10/4/2018</a:t>
+              <a:t>10/5/2018</a:t>
             </a:fld>
             <a:endParaRPr lang="en-US"/>
           </a:p>
@@ -4453,8 +4454,8 @@
           <p:nvPr/>
         </p:nvGraphicFramePr>
         <p:xfrm>
-          <a:off x="2214515" y="3330262"/>
-          <a:ext cx="4429188" cy="1170308"/>
+          <a:off x="3428992" y="2428868"/>
+          <a:ext cx="3786245" cy="3823976"/>
         </p:xfrm>
         <a:graphic>
           <a:graphicData uri="http://schemas.openxmlformats.org/drawingml/2006/table">
@@ -4463,10 +4464,10 @@
                 <a:tableStyleId>{2D5ABB26-0587-4C30-8999-92F81FD0307C}</a:tableStyleId>
               </a:tblPr>
               <a:tblGrid>
-                <a:gridCol w="1476396"/>
-                <a:gridCol w="2952792"/>
+                <a:gridCol w="1262082"/>
+                <a:gridCol w="2524163"/>
               </a:tblGrid>
-              <a:tr h="585154">
+              <a:tr h="477997">
                 <a:tc>
                   <a:txBody>
                     <a:bodyPr/>
@@ -4600,13 +4601,20 @@
                   </a:tcPr>
                 </a:tc>
               </a:tr>
-              <a:tr h="585154">
+              <a:tr h="477997">
                 <a:tc>
                   <a:txBody>
                     <a:bodyPr/>
                     <a:lstStyle/>
                     <a:p>
                       <a:pPr algn="ctr"/>
+                      <a:r>
+                        <a:rPr lang="en-IN" sz="2000" b="0" dirty="0" smtClean="0">
+                          <a:latin typeface="Cambria" pitchFamily="18" charset="0"/>
+                          <a:ea typeface="Cambria" pitchFamily="18" charset="0"/>
+                        </a:rPr>
+                        <a:t>+</a:t>
+                      </a:r>
                       <a:endParaRPr lang="en-US" sz="2000" b="0" dirty="0">
                         <a:latin typeface="Cambria" pitchFamily="18" charset="0"/>
                         <a:ea typeface="Cambria" pitchFamily="18" charset="0"/>
@@ -4682,6 +4690,913 @@
                         <a:tabLst/>
                         <a:defRPr/>
                       </a:pPr>
+                      <a:r>
+                        <a:rPr lang="en-IN" sz="2000" b="0" dirty="0" smtClean="0">
+                          <a:latin typeface="Cambria" pitchFamily="18" charset="0"/>
+                          <a:ea typeface="Cambria" pitchFamily="18" charset="0"/>
+                        </a:rPr>
+                        <a:t>Addition</a:t>
+                      </a:r>
+                      <a:endParaRPr lang="en-US" sz="2000" b="0" dirty="0" smtClean="0">
+                        <a:latin typeface="Cambria" pitchFamily="18" charset="0"/>
+                        <a:ea typeface="Cambria" pitchFamily="18" charset="0"/>
+                      </a:endParaRPr>
+                    </a:p>
+                  </a:txBody>
+                  <a:tcPr anchor="ctr">
+                    <a:lnL w="12700" cap="flat" cmpd="sng" algn="ctr">
+                      <a:solidFill>
+                        <a:schemeClr val="tx1"/>
+                      </a:solidFill>
+                      <a:prstDash val="solid"/>
+                      <a:round/>
+                      <a:headEnd type="none" w="med" len="med"/>
+                      <a:tailEnd type="none" w="med" len="med"/>
+                    </a:lnL>
+                    <a:lnR w="12700" cap="flat" cmpd="sng" algn="ctr">
+                      <a:solidFill>
+                        <a:schemeClr val="tx1"/>
+                      </a:solidFill>
+                      <a:prstDash val="solid"/>
+                      <a:round/>
+                      <a:headEnd type="none" w="med" len="med"/>
+                      <a:tailEnd type="none" w="med" len="med"/>
+                    </a:lnR>
+                    <a:lnT w="12700" cap="flat" cmpd="sng" algn="ctr">
+                      <a:solidFill>
+                        <a:schemeClr val="tx1"/>
+                      </a:solidFill>
+                      <a:prstDash val="solid"/>
+                      <a:round/>
+                      <a:headEnd type="none" w="med" len="med"/>
+                      <a:tailEnd type="none" w="med" len="med"/>
+                    </a:lnT>
+                    <a:lnB w="12700" cap="flat" cmpd="sng" algn="ctr">
+                      <a:solidFill>
+                        <a:schemeClr val="tx1"/>
+                      </a:solidFill>
+                      <a:prstDash val="solid"/>
+                      <a:round/>
+                      <a:headEnd type="none" w="med" len="med"/>
+                      <a:tailEnd type="none" w="med" len="med"/>
+                    </a:lnB>
+                    <a:lnTlToBr w="12700" cmpd="sng">
+                      <a:noFill/>
+                      <a:prstDash val="solid"/>
+                    </a:lnTlToBr>
+                    <a:lnBlToTr w="12700" cmpd="sng">
+                      <a:noFill/>
+                      <a:prstDash val="solid"/>
+                    </a:lnBlToTr>
+                  </a:tcPr>
+                </a:tc>
+              </a:tr>
+              <a:tr h="477997">
+                <a:tc>
+                  <a:txBody>
+                    <a:bodyPr/>
+                    <a:lstStyle/>
+                    <a:p>
+                      <a:pPr algn="ctr"/>
+                      <a:r>
+                        <a:rPr lang="en-IN" sz="2000" b="0" dirty="0" smtClean="0">
+                          <a:latin typeface="Cambria" pitchFamily="18" charset="0"/>
+                          <a:ea typeface="Cambria" pitchFamily="18" charset="0"/>
+                        </a:rPr>
+                        <a:t>-</a:t>
+                      </a:r>
+                      <a:endParaRPr lang="en-US" sz="2000" b="0" dirty="0">
+                        <a:latin typeface="Cambria" pitchFamily="18" charset="0"/>
+                        <a:ea typeface="Cambria" pitchFamily="18" charset="0"/>
+                      </a:endParaRPr>
+                    </a:p>
+                  </a:txBody>
+                  <a:tcPr anchor="ctr">
+                    <a:lnL w="12700" cap="flat" cmpd="sng" algn="ctr">
+                      <a:solidFill>
+                        <a:schemeClr val="tx1"/>
+                      </a:solidFill>
+                      <a:prstDash val="solid"/>
+                      <a:round/>
+                      <a:headEnd type="none" w="med" len="med"/>
+                      <a:tailEnd type="none" w="med" len="med"/>
+                    </a:lnL>
+                    <a:lnR w="12700" cap="flat" cmpd="sng" algn="ctr">
+                      <a:solidFill>
+                        <a:schemeClr val="tx1"/>
+                      </a:solidFill>
+                      <a:prstDash val="solid"/>
+                      <a:round/>
+                      <a:headEnd type="none" w="med" len="med"/>
+                      <a:tailEnd type="none" w="med" len="med"/>
+                    </a:lnR>
+                    <a:lnT w="12700" cap="flat" cmpd="sng" algn="ctr">
+                      <a:solidFill>
+                        <a:schemeClr val="tx1"/>
+                      </a:solidFill>
+                      <a:prstDash val="solid"/>
+                      <a:round/>
+                      <a:headEnd type="none" w="med" len="med"/>
+                      <a:tailEnd type="none" w="med" len="med"/>
+                    </a:lnT>
+                    <a:lnB w="12700" cap="flat" cmpd="sng" algn="ctr">
+                      <a:solidFill>
+                        <a:schemeClr val="tx1"/>
+                      </a:solidFill>
+                      <a:prstDash val="solid"/>
+                      <a:round/>
+                      <a:headEnd type="none" w="med" len="med"/>
+                      <a:tailEnd type="none" w="med" len="med"/>
+                    </a:lnB>
+                    <a:lnTlToBr w="12700" cmpd="sng">
+                      <a:noFill/>
+                      <a:prstDash val="solid"/>
+                    </a:lnTlToBr>
+                    <a:lnBlToTr w="12700" cmpd="sng">
+                      <a:noFill/>
+                      <a:prstDash val="solid"/>
+                    </a:lnBlToTr>
+                  </a:tcPr>
+                </a:tc>
+                <a:tc>
+                  <a:txBody>
+                    <a:bodyPr/>
+                    <a:lstStyle/>
+                    <a:p>
+                      <a:pPr marL="0" marR="0" indent="0" algn="ctr" defTabSz="914400" rtl="0" eaLnBrk="1" fontAlgn="auto" latinLnBrk="0" hangingPunct="1">
+                        <a:lnSpc>
+                          <a:spcPct val="100000"/>
+                        </a:lnSpc>
+                        <a:spcBef>
+                          <a:spcPts val="0"/>
+                        </a:spcBef>
+                        <a:spcAft>
+                          <a:spcPts val="0"/>
+                        </a:spcAft>
+                        <a:buClrTx/>
+                        <a:buSzTx/>
+                        <a:buFontTx/>
+                        <a:buNone/>
+                        <a:tabLst/>
+                        <a:defRPr/>
+                      </a:pPr>
+                      <a:r>
+                        <a:rPr lang="en-IN" sz="2000" b="0" dirty="0" smtClean="0">
+                          <a:latin typeface="Cambria" pitchFamily="18" charset="0"/>
+                          <a:ea typeface="Cambria" pitchFamily="18" charset="0"/>
+                        </a:rPr>
+                        <a:t>Subtraction</a:t>
+                      </a:r>
+                      <a:endParaRPr lang="en-US" sz="2000" b="0" dirty="0" smtClean="0">
+                        <a:latin typeface="Cambria" pitchFamily="18" charset="0"/>
+                        <a:ea typeface="Cambria" pitchFamily="18" charset="0"/>
+                      </a:endParaRPr>
+                    </a:p>
+                  </a:txBody>
+                  <a:tcPr anchor="ctr">
+                    <a:lnL w="12700" cap="flat" cmpd="sng" algn="ctr">
+                      <a:solidFill>
+                        <a:schemeClr val="tx1"/>
+                      </a:solidFill>
+                      <a:prstDash val="solid"/>
+                      <a:round/>
+                      <a:headEnd type="none" w="med" len="med"/>
+                      <a:tailEnd type="none" w="med" len="med"/>
+                    </a:lnL>
+                    <a:lnR w="12700" cap="flat" cmpd="sng" algn="ctr">
+                      <a:solidFill>
+                        <a:schemeClr val="tx1"/>
+                      </a:solidFill>
+                      <a:prstDash val="solid"/>
+                      <a:round/>
+                      <a:headEnd type="none" w="med" len="med"/>
+                      <a:tailEnd type="none" w="med" len="med"/>
+                    </a:lnR>
+                    <a:lnT w="12700" cap="flat" cmpd="sng" algn="ctr">
+                      <a:solidFill>
+                        <a:schemeClr val="tx1"/>
+                      </a:solidFill>
+                      <a:prstDash val="solid"/>
+                      <a:round/>
+                      <a:headEnd type="none" w="med" len="med"/>
+                      <a:tailEnd type="none" w="med" len="med"/>
+                    </a:lnT>
+                    <a:lnB w="12700" cap="flat" cmpd="sng" algn="ctr">
+                      <a:solidFill>
+                        <a:schemeClr val="tx1"/>
+                      </a:solidFill>
+                      <a:prstDash val="solid"/>
+                      <a:round/>
+                      <a:headEnd type="none" w="med" len="med"/>
+                      <a:tailEnd type="none" w="med" len="med"/>
+                    </a:lnB>
+                    <a:lnTlToBr w="12700" cmpd="sng">
+                      <a:noFill/>
+                      <a:prstDash val="solid"/>
+                    </a:lnTlToBr>
+                    <a:lnBlToTr w="12700" cmpd="sng">
+                      <a:noFill/>
+                      <a:prstDash val="solid"/>
+                    </a:lnBlToTr>
+                  </a:tcPr>
+                </a:tc>
+              </a:tr>
+              <a:tr h="477997">
+                <a:tc>
+                  <a:txBody>
+                    <a:bodyPr/>
+                    <a:lstStyle/>
+                    <a:p>
+                      <a:pPr algn="ctr"/>
+                      <a:r>
+                        <a:rPr lang="en-IN" sz="2000" b="0" dirty="0" smtClean="0">
+                          <a:latin typeface="Cambria" pitchFamily="18" charset="0"/>
+                          <a:ea typeface="Cambria" pitchFamily="18" charset="0"/>
+                        </a:rPr>
+                        <a:t>*</a:t>
+                      </a:r>
+                      <a:endParaRPr lang="en-US" sz="2000" b="0" dirty="0">
+                        <a:latin typeface="Cambria" pitchFamily="18" charset="0"/>
+                        <a:ea typeface="Cambria" pitchFamily="18" charset="0"/>
+                      </a:endParaRPr>
+                    </a:p>
+                  </a:txBody>
+                  <a:tcPr anchor="ctr">
+                    <a:lnL w="12700" cap="flat" cmpd="sng" algn="ctr">
+                      <a:solidFill>
+                        <a:schemeClr val="tx1"/>
+                      </a:solidFill>
+                      <a:prstDash val="solid"/>
+                      <a:round/>
+                      <a:headEnd type="none" w="med" len="med"/>
+                      <a:tailEnd type="none" w="med" len="med"/>
+                    </a:lnL>
+                    <a:lnR w="12700" cap="flat" cmpd="sng" algn="ctr">
+                      <a:solidFill>
+                        <a:schemeClr val="tx1"/>
+                      </a:solidFill>
+                      <a:prstDash val="solid"/>
+                      <a:round/>
+                      <a:headEnd type="none" w="med" len="med"/>
+                      <a:tailEnd type="none" w="med" len="med"/>
+                    </a:lnR>
+                    <a:lnT w="12700" cap="flat" cmpd="sng" algn="ctr">
+                      <a:solidFill>
+                        <a:schemeClr val="tx1"/>
+                      </a:solidFill>
+                      <a:prstDash val="solid"/>
+                      <a:round/>
+                      <a:headEnd type="none" w="med" len="med"/>
+                      <a:tailEnd type="none" w="med" len="med"/>
+                    </a:lnT>
+                    <a:lnB w="12700" cap="flat" cmpd="sng" algn="ctr">
+                      <a:solidFill>
+                        <a:schemeClr val="tx1"/>
+                      </a:solidFill>
+                      <a:prstDash val="solid"/>
+                      <a:round/>
+                      <a:headEnd type="none" w="med" len="med"/>
+                      <a:tailEnd type="none" w="med" len="med"/>
+                    </a:lnB>
+                    <a:lnTlToBr w="12700" cmpd="sng">
+                      <a:noFill/>
+                      <a:prstDash val="solid"/>
+                    </a:lnTlToBr>
+                    <a:lnBlToTr w="12700" cmpd="sng">
+                      <a:noFill/>
+                      <a:prstDash val="solid"/>
+                    </a:lnBlToTr>
+                  </a:tcPr>
+                </a:tc>
+                <a:tc>
+                  <a:txBody>
+                    <a:bodyPr/>
+                    <a:lstStyle/>
+                    <a:p>
+                      <a:pPr marL="0" marR="0" indent="0" algn="ctr" defTabSz="914400" rtl="0" eaLnBrk="1" fontAlgn="auto" latinLnBrk="0" hangingPunct="1">
+                        <a:lnSpc>
+                          <a:spcPct val="100000"/>
+                        </a:lnSpc>
+                        <a:spcBef>
+                          <a:spcPts val="0"/>
+                        </a:spcBef>
+                        <a:spcAft>
+                          <a:spcPts val="0"/>
+                        </a:spcAft>
+                        <a:buClrTx/>
+                        <a:buSzTx/>
+                        <a:buFontTx/>
+                        <a:buNone/>
+                        <a:tabLst/>
+                        <a:defRPr/>
+                      </a:pPr>
+                      <a:r>
+                        <a:rPr lang="en-IN" sz="2000" b="0" dirty="0" smtClean="0">
+                          <a:latin typeface="Cambria" pitchFamily="18" charset="0"/>
+                          <a:ea typeface="Cambria" pitchFamily="18" charset="0"/>
+                        </a:rPr>
+                        <a:t>Multiplication</a:t>
+                      </a:r>
+                      <a:endParaRPr lang="en-US" sz="2000" b="0" dirty="0" smtClean="0">
+                        <a:latin typeface="Cambria" pitchFamily="18" charset="0"/>
+                        <a:ea typeface="Cambria" pitchFamily="18" charset="0"/>
+                      </a:endParaRPr>
+                    </a:p>
+                  </a:txBody>
+                  <a:tcPr anchor="ctr">
+                    <a:lnL w="12700" cap="flat" cmpd="sng" algn="ctr">
+                      <a:solidFill>
+                        <a:schemeClr val="tx1"/>
+                      </a:solidFill>
+                      <a:prstDash val="solid"/>
+                      <a:round/>
+                      <a:headEnd type="none" w="med" len="med"/>
+                      <a:tailEnd type="none" w="med" len="med"/>
+                    </a:lnL>
+                    <a:lnR w="12700" cap="flat" cmpd="sng" algn="ctr">
+                      <a:solidFill>
+                        <a:schemeClr val="tx1"/>
+                      </a:solidFill>
+                      <a:prstDash val="solid"/>
+                      <a:round/>
+                      <a:headEnd type="none" w="med" len="med"/>
+                      <a:tailEnd type="none" w="med" len="med"/>
+                    </a:lnR>
+                    <a:lnT w="12700" cap="flat" cmpd="sng" algn="ctr">
+                      <a:solidFill>
+                        <a:schemeClr val="tx1"/>
+                      </a:solidFill>
+                      <a:prstDash val="solid"/>
+                      <a:round/>
+                      <a:headEnd type="none" w="med" len="med"/>
+                      <a:tailEnd type="none" w="med" len="med"/>
+                    </a:lnT>
+                    <a:lnB w="12700" cap="flat" cmpd="sng" algn="ctr">
+                      <a:solidFill>
+                        <a:schemeClr val="tx1"/>
+                      </a:solidFill>
+                      <a:prstDash val="solid"/>
+                      <a:round/>
+                      <a:headEnd type="none" w="med" len="med"/>
+                      <a:tailEnd type="none" w="med" len="med"/>
+                    </a:lnB>
+                    <a:lnTlToBr w="12700" cmpd="sng">
+                      <a:noFill/>
+                      <a:prstDash val="solid"/>
+                    </a:lnTlToBr>
+                    <a:lnBlToTr w="12700" cmpd="sng">
+                      <a:noFill/>
+                      <a:prstDash val="solid"/>
+                    </a:lnBlToTr>
+                  </a:tcPr>
+                </a:tc>
+              </a:tr>
+              <a:tr h="477997">
+                <a:tc>
+                  <a:txBody>
+                    <a:bodyPr/>
+                    <a:lstStyle/>
+                    <a:p>
+                      <a:pPr algn="ctr"/>
+                      <a:r>
+                        <a:rPr lang="en-IN" sz="2000" b="0" dirty="0" smtClean="0">
+                          <a:latin typeface="Cambria" pitchFamily="18" charset="0"/>
+                          <a:ea typeface="Cambria" pitchFamily="18" charset="0"/>
+                        </a:rPr>
+                        <a:t>/</a:t>
+                      </a:r>
+                      <a:endParaRPr lang="en-US" sz="2000" b="0" dirty="0">
+                        <a:latin typeface="Cambria" pitchFamily="18" charset="0"/>
+                        <a:ea typeface="Cambria" pitchFamily="18" charset="0"/>
+                      </a:endParaRPr>
+                    </a:p>
+                  </a:txBody>
+                  <a:tcPr anchor="ctr">
+                    <a:lnL w="12700" cap="flat" cmpd="sng" algn="ctr">
+                      <a:solidFill>
+                        <a:schemeClr val="tx1"/>
+                      </a:solidFill>
+                      <a:prstDash val="solid"/>
+                      <a:round/>
+                      <a:headEnd type="none" w="med" len="med"/>
+                      <a:tailEnd type="none" w="med" len="med"/>
+                    </a:lnL>
+                    <a:lnR w="12700" cap="flat" cmpd="sng" algn="ctr">
+                      <a:solidFill>
+                        <a:schemeClr val="tx1"/>
+                      </a:solidFill>
+                      <a:prstDash val="solid"/>
+                      <a:round/>
+                      <a:headEnd type="none" w="med" len="med"/>
+                      <a:tailEnd type="none" w="med" len="med"/>
+                    </a:lnR>
+                    <a:lnT w="12700" cap="flat" cmpd="sng" algn="ctr">
+                      <a:solidFill>
+                        <a:schemeClr val="tx1"/>
+                      </a:solidFill>
+                      <a:prstDash val="solid"/>
+                      <a:round/>
+                      <a:headEnd type="none" w="med" len="med"/>
+                      <a:tailEnd type="none" w="med" len="med"/>
+                    </a:lnT>
+                    <a:lnB w="12700" cap="flat" cmpd="sng" algn="ctr">
+                      <a:solidFill>
+                        <a:schemeClr val="tx1"/>
+                      </a:solidFill>
+                      <a:prstDash val="solid"/>
+                      <a:round/>
+                      <a:headEnd type="none" w="med" len="med"/>
+                      <a:tailEnd type="none" w="med" len="med"/>
+                    </a:lnB>
+                    <a:lnTlToBr w="12700" cmpd="sng">
+                      <a:noFill/>
+                      <a:prstDash val="solid"/>
+                    </a:lnTlToBr>
+                    <a:lnBlToTr w="12700" cmpd="sng">
+                      <a:noFill/>
+                      <a:prstDash val="solid"/>
+                    </a:lnBlToTr>
+                  </a:tcPr>
+                </a:tc>
+                <a:tc>
+                  <a:txBody>
+                    <a:bodyPr/>
+                    <a:lstStyle/>
+                    <a:p>
+                      <a:pPr marL="0" marR="0" indent="0" algn="ctr" defTabSz="914400" rtl="0" eaLnBrk="1" fontAlgn="auto" latinLnBrk="0" hangingPunct="1">
+                        <a:lnSpc>
+                          <a:spcPct val="100000"/>
+                        </a:lnSpc>
+                        <a:spcBef>
+                          <a:spcPts val="0"/>
+                        </a:spcBef>
+                        <a:spcAft>
+                          <a:spcPts val="0"/>
+                        </a:spcAft>
+                        <a:buClrTx/>
+                        <a:buSzTx/>
+                        <a:buFontTx/>
+                        <a:buNone/>
+                        <a:tabLst/>
+                        <a:defRPr/>
+                      </a:pPr>
+                      <a:r>
+                        <a:rPr lang="en-IN" sz="2000" b="0" dirty="0" smtClean="0">
+                          <a:latin typeface="Cambria" pitchFamily="18" charset="0"/>
+                          <a:ea typeface="Cambria" pitchFamily="18" charset="0"/>
+                        </a:rPr>
+                        <a:t>Division</a:t>
+                      </a:r>
+                      <a:endParaRPr lang="en-US" sz="2000" b="0" dirty="0" smtClean="0">
+                        <a:latin typeface="Cambria" pitchFamily="18" charset="0"/>
+                        <a:ea typeface="Cambria" pitchFamily="18" charset="0"/>
+                      </a:endParaRPr>
+                    </a:p>
+                  </a:txBody>
+                  <a:tcPr anchor="ctr">
+                    <a:lnL w="12700" cap="flat" cmpd="sng" algn="ctr">
+                      <a:solidFill>
+                        <a:schemeClr val="tx1"/>
+                      </a:solidFill>
+                      <a:prstDash val="solid"/>
+                      <a:round/>
+                      <a:headEnd type="none" w="med" len="med"/>
+                      <a:tailEnd type="none" w="med" len="med"/>
+                    </a:lnL>
+                    <a:lnR w="12700" cap="flat" cmpd="sng" algn="ctr">
+                      <a:solidFill>
+                        <a:schemeClr val="tx1"/>
+                      </a:solidFill>
+                      <a:prstDash val="solid"/>
+                      <a:round/>
+                      <a:headEnd type="none" w="med" len="med"/>
+                      <a:tailEnd type="none" w="med" len="med"/>
+                    </a:lnR>
+                    <a:lnT w="12700" cap="flat" cmpd="sng" algn="ctr">
+                      <a:solidFill>
+                        <a:schemeClr val="tx1"/>
+                      </a:solidFill>
+                      <a:prstDash val="solid"/>
+                      <a:round/>
+                      <a:headEnd type="none" w="med" len="med"/>
+                      <a:tailEnd type="none" w="med" len="med"/>
+                    </a:lnT>
+                    <a:lnB w="12700" cap="flat" cmpd="sng" algn="ctr">
+                      <a:solidFill>
+                        <a:schemeClr val="tx1"/>
+                      </a:solidFill>
+                      <a:prstDash val="solid"/>
+                      <a:round/>
+                      <a:headEnd type="none" w="med" len="med"/>
+                      <a:tailEnd type="none" w="med" len="med"/>
+                    </a:lnB>
+                    <a:lnTlToBr w="12700" cmpd="sng">
+                      <a:noFill/>
+                      <a:prstDash val="solid"/>
+                    </a:lnTlToBr>
+                    <a:lnBlToTr w="12700" cmpd="sng">
+                      <a:noFill/>
+                      <a:prstDash val="solid"/>
+                    </a:lnBlToTr>
+                  </a:tcPr>
+                </a:tc>
+              </a:tr>
+              <a:tr h="477997">
+                <a:tc>
+                  <a:txBody>
+                    <a:bodyPr/>
+                    <a:lstStyle/>
+                    <a:p>
+                      <a:pPr algn="ctr"/>
+                      <a:r>
+                        <a:rPr lang="en-IN" sz="2000" b="0" dirty="0" smtClean="0">
+                          <a:latin typeface="Cambria" pitchFamily="18" charset="0"/>
+                          <a:ea typeface="Cambria" pitchFamily="18" charset="0"/>
+                        </a:rPr>
+                        <a:t>%</a:t>
+                      </a:r>
+                      <a:endParaRPr lang="en-US" sz="2000" b="0" dirty="0">
+                        <a:latin typeface="Cambria" pitchFamily="18" charset="0"/>
+                        <a:ea typeface="Cambria" pitchFamily="18" charset="0"/>
+                      </a:endParaRPr>
+                    </a:p>
+                  </a:txBody>
+                  <a:tcPr anchor="ctr">
+                    <a:lnL w="12700" cap="flat" cmpd="sng" algn="ctr">
+                      <a:solidFill>
+                        <a:schemeClr val="tx1"/>
+                      </a:solidFill>
+                      <a:prstDash val="solid"/>
+                      <a:round/>
+                      <a:headEnd type="none" w="med" len="med"/>
+                      <a:tailEnd type="none" w="med" len="med"/>
+                    </a:lnL>
+                    <a:lnR w="12700" cap="flat" cmpd="sng" algn="ctr">
+                      <a:solidFill>
+                        <a:schemeClr val="tx1"/>
+                      </a:solidFill>
+                      <a:prstDash val="solid"/>
+                      <a:round/>
+                      <a:headEnd type="none" w="med" len="med"/>
+                      <a:tailEnd type="none" w="med" len="med"/>
+                    </a:lnR>
+                    <a:lnT w="12700" cap="flat" cmpd="sng" algn="ctr">
+                      <a:solidFill>
+                        <a:schemeClr val="tx1"/>
+                      </a:solidFill>
+                      <a:prstDash val="solid"/>
+                      <a:round/>
+                      <a:headEnd type="none" w="med" len="med"/>
+                      <a:tailEnd type="none" w="med" len="med"/>
+                    </a:lnT>
+                    <a:lnB w="12700" cap="flat" cmpd="sng" algn="ctr">
+                      <a:solidFill>
+                        <a:schemeClr val="tx1"/>
+                      </a:solidFill>
+                      <a:prstDash val="solid"/>
+                      <a:round/>
+                      <a:headEnd type="none" w="med" len="med"/>
+                      <a:tailEnd type="none" w="med" len="med"/>
+                    </a:lnB>
+                    <a:lnTlToBr w="12700" cmpd="sng">
+                      <a:noFill/>
+                      <a:prstDash val="solid"/>
+                    </a:lnTlToBr>
+                    <a:lnBlToTr w="12700" cmpd="sng">
+                      <a:noFill/>
+                      <a:prstDash val="solid"/>
+                    </a:lnBlToTr>
+                  </a:tcPr>
+                </a:tc>
+                <a:tc>
+                  <a:txBody>
+                    <a:bodyPr/>
+                    <a:lstStyle/>
+                    <a:p>
+                      <a:pPr marL="0" marR="0" indent="0" algn="ctr" defTabSz="914400" rtl="0" eaLnBrk="1" fontAlgn="auto" latinLnBrk="0" hangingPunct="1">
+                        <a:lnSpc>
+                          <a:spcPct val="100000"/>
+                        </a:lnSpc>
+                        <a:spcBef>
+                          <a:spcPts val="0"/>
+                        </a:spcBef>
+                        <a:spcAft>
+                          <a:spcPts val="0"/>
+                        </a:spcAft>
+                        <a:buClrTx/>
+                        <a:buSzTx/>
+                        <a:buFontTx/>
+                        <a:buNone/>
+                        <a:tabLst/>
+                        <a:defRPr/>
+                      </a:pPr>
+                      <a:r>
+                        <a:rPr lang="en-IN" sz="2000" b="0" dirty="0" smtClean="0">
+                          <a:latin typeface="Cambria" pitchFamily="18" charset="0"/>
+                          <a:ea typeface="Cambria" pitchFamily="18" charset="0"/>
+                        </a:rPr>
+                        <a:t>Modules</a:t>
+                      </a:r>
+                      <a:endParaRPr lang="en-US" sz="2000" b="0" dirty="0" smtClean="0">
+                        <a:latin typeface="Cambria" pitchFamily="18" charset="0"/>
+                        <a:ea typeface="Cambria" pitchFamily="18" charset="0"/>
+                      </a:endParaRPr>
+                    </a:p>
+                  </a:txBody>
+                  <a:tcPr anchor="ctr">
+                    <a:lnL w="12700" cap="flat" cmpd="sng" algn="ctr">
+                      <a:solidFill>
+                        <a:schemeClr val="tx1"/>
+                      </a:solidFill>
+                      <a:prstDash val="solid"/>
+                      <a:round/>
+                      <a:headEnd type="none" w="med" len="med"/>
+                      <a:tailEnd type="none" w="med" len="med"/>
+                    </a:lnL>
+                    <a:lnR w="12700" cap="flat" cmpd="sng" algn="ctr">
+                      <a:solidFill>
+                        <a:schemeClr val="tx1"/>
+                      </a:solidFill>
+                      <a:prstDash val="solid"/>
+                      <a:round/>
+                      <a:headEnd type="none" w="med" len="med"/>
+                      <a:tailEnd type="none" w="med" len="med"/>
+                    </a:lnR>
+                    <a:lnT w="12700" cap="flat" cmpd="sng" algn="ctr">
+                      <a:solidFill>
+                        <a:schemeClr val="tx1"/>
+                      </a:solidFill>
+                      <a:prstDash val="solid"/>
+                      <a:round/>
+                      <a:headEnd type="none" w="med" len="med"/>
+                      <a:tailEnd type="none" w="med" len="med"/>
+                    </a:lnT>
+                    <a:lnB w="12700" cap="flat" cmpd="sng" algn="ctr">
+                      <a:solidFill>
+                        <a:schemeClr val="tx1"/>
+                      </a:solidFill>
+                      <a:prstDash val="solid"/>
+                      <a:round/>
+                      <a:headEnd type="none" w="med" len="med"/>
+                      <a:tailEnd type="none" w="med" len="med"/>
+                    </a:lnB>
+                    <a:lnTlToBr w="12700" cmpd="sng">
+                      <a:noFill/>
+                      <a:prstDash val="solid"/>
+                    </a:lnTlToBr>
+                    <a:lnBlToTr w="12700" cmpd="sng">
+                      <a:noFill/>
+                      <a:prstDash val="solid"/>
+                    </a:lnBlToTr>
+                  </a:tcPr>
+                </a:tc>
+              </a:tr>
+              <a:tr h="477997">
+                <a:tc>
+                  <a:txBody>
+                    <a:bodyPr/>
+                    <a:lstStyle/>
+                    <a:p>
+                      <a:pPr algn="ctr"/>
+                      <a:r>
+                        <a:rPr lang="en-IN" sz="2000" b="0" dirty="0" smtClean="0">
+                          <a:latin typeface="Cambria" pitchFamily="18" charset="0"/>
+                          <a:ea typeface="Cambria" pitchFamily="18" charset="0"/>
+                        </a:rPr>
+                        <a:t>**</a:t>
+                      </a:r>
+                      <a:endParaRPr lang="en-US" sz="2000" b="0" dirty="0">
+                        <a:latin typeface="Cambria" pitchFamily="18" charset="0"/>
+                        <a:ea typeface="Cambria" pitchFamily="18" charset="0"/>
+                      </a:endParaRPr>
+                    </a:p>
+                  </a:txBody>
+                  <a:tcPr anchor="ctr">
+                    <a:lnL w="12700" cap="flat" cmpd="sng" algn="ctr">
+                      <a:solidFill>
+                        <a:schemeClr val="tx1"/>
+                      </a:solidFill>
+                      <a:prstDash val="solid"/>
+                      <a:round/>
+                      <a:headEnd type="none" w="med" len="med"/>
+                      <a:tailEnd type="none" w="med" len="med"/>
+                    </a:lnL>
+                    <a:lnR w="12700" cap="flat" cmpd="sng" algn="ctr">
+                      <a:solidFill>
+                        <a:schemeClr val="tx1"/>
+                      </a:solidFill>
+                      <a:prstDash val="solid"/>
+                      <a:round/>
+                      <a:headEnd type="none" w="med" len="med"/>
+                      <a:tailEnd type="none" w="med" len="med"/>
+                    </a:lnR>
+                    <a:lnT w="12700" cap="flat" cmpd="sng" algn="ctr">
+                      <a:solidFill>
+                        <a:schemeClr val="tx1"/>
+                      </a:solidFill>
+                      <a:prstDash val="solid"/>
+                      <a:round/>
+                      <a:headEnd type="none" w="med" len="med"/>
+                      <a:tailEnd type="none" w="med" len="med"/>
+                    </a:lnT>
+                    <a:lnB w="12700" cap="flat" cmpd="sng" algn="ctr">
+                      <a:solidFill>
+                        <a:schemeClr val="tx1"/>
+                      </a:solidFill>
+                      <a:prstDash val="solid"/>
+                      <a:round/>
+                      <a:headEnd type="none" w="med" len="med"/>
+                      <a:tailEnd type="none" w="med" len="med"/>
+                    </a:lnB>
+                    <a:lnTlToBr w="12700" cmpd="sng">
+                      <a:noFill/>
+                      <a:prstDash val="solid"/>
+                    </a:lnTlToBr>
+                    <a:lnBlToTr w="12700" cmpd="sng">
+                      <a:noFill/>
+                      <a:prstDash val="solid"/>
+                    </a:lnBlToTr>
+                  </a:tcPr>
+                </a:tc>
+                <a:tc>
+                  <a:txBody>
+                    <a:bodyPr/>
+                    <a:lstStyle/>
+                    <a:p>
+                      <a:pPr marL="0" marR="0" indent="0" algn="ctr" defTabSz="914400" rtl="0" eaLnBrk="1" fontAlgn="auto" latinLnBrk="0" hangingPunct="1">
+                        <a:lnSpc>
+                          <a:spcPct val="100000"/>
+                        </a:lnSpc>
+                        <a:spcBef>
+                          <a:spcPts val="0"/>
+                        </a:spcBef>
+                        <a:spcAft>
+                          <a:spcPts val="0"/>
+                        </a:spcAft>
+                        <a:buClrTx/>
+                        <a:buSzTx/>
+                        <a:buFontTx/>
+                        <a:buNone/>
+                        <a:tabLst/>
+                        <a:defRPr/>
+                      </a:pPr>
+                      <a:r>
+                        <a:rPr lang="en-IN" sz="2000" b="0" dirty="0" smtClean="0">
+                          <a:latin typeface="Cambria" pitchFamily="18" charset="0"/>
+                          <a:ea typeface="Cambria" pitchFamily="18" charset="0"/>
+                        </a:rPr>
+                        <a:t>Exponent [Power]</a:t>
+                      </a:r>
+                      <a:endParaRPr lang="en-US" sz="2000" b="0" dirty="0" smtClean="0">
+                        <a:latin typeface="Cambria" pitchFamily="18" charset="0"/>
+                        <a:ea typeface="Cambria" pitchFamily="18" charset="0"/>
+                      </a:endParaRPr>
+                    </a:p>
+                  </a:txBody>
+                  <a:tcPr anchor="ctr">
+                    <a:lnL w="12700" cap="flat" cmpd="sng" algn="ctr">
+                      <a:solidFill>
+                        <a:schemeClr val="tx1"/>
+                      </a:solidFill>
+                      <a:prstDash val="solid"/>
+                      <a:round/>
+                      <a:headEnd type="none" w="med" len="med"/>
+                      <a:tailEnd type="none" w="med" len="med"/>
+                    </a:lnL>
+                    <a:lnR w="12700" cap="flat" cmpd="sng" algn="ctr">
+                      <a:solidFill>
+                        <a:schemeClr val="tx1"/>
+                      </a:solidFill>
+                      <a:prstDash val="solid"/>
+                      <a:round/>
+                      <a:headEnd type="none" w="med" len="med"/>
+                      <a:tailEnd type="none" w="med" len="med"/>
+                    </a:lnR>
+                    <a:lnT w="12700" cap="flat" cmpd="sng" algn="ctr">
+                      <a:solidFill>
+                        <a:schemeClr val="tx1"/>
+                      </a:solidFill>
+                      <a:prstDash val="solid"/>
+                      <a:round/>
+                      <a:headEnd type="none" w="med" len="med"/>
+                      <a:tailEnd type="none" w="med" len="med"/>
+                    </a:lnT>
+                    <a:lnB w="12700" cap="flat" cmpd="sng" algn="ctr">
+                      <a:solidFill>
+                        <a:schemeClr val="tx1"/>
+                      </a:solidFill>
+                      <a:prstDash val="solid"/>
+                      <a:round/>
+                      <a:headEnd type="none" w="med" len="med"/>
+                      <a:tailEnd type="none" w="med" len="med"/>
+                    </a:lnB>
+                    <a:lnTlToBr w="12700" cmpd="sng">
+                      <a:noFill/>
+                      <a:prstDash val="solid"/>
+                    </a:lnTlToBr>
+                    <a:lnBlToTr w="12700" cmpd="sng">
+                      <a:noFill/>
+                      <a:prstDash val="solid"/>
+                    </a:lnBlToTr>
+                  </a:tcPr>
+                </a:tc>
+              </a:tr>
+              <a:tr h="477997">
+                <a:tc>
+                  <a:txBody>
+                    <a:bodyPr/>
+                    <a:lstStyle/>
+                    <a:p>
+                      <a:pPr algn="ctr"/>
+                      <a:r>
+                        <a:rPr lang="en-IN" sz="2000" b="0" dirty="0" smtClean="0">
+                          <a:latin typeface="Cambria" pitchFamily="18" charset="0"/>
+                          <a:ea typeface="Cambria" pitchFamily="18" charset="0"/>
+                        </a:rPr>
+                        <a:t>//</a:t>
+                      </a:r>
+                      <a:endParaRPr lang="en-US" sz="2000" b="0" dirty="0">
+                        <a:latin typeface="Cambria" pitchFamily="18" charset="0"/>
+                        <a:ea typeface="Cambria" pitchFamily="18" charset="0"/>
+                      </a:endParaRPr>
+                    </a:p>
+                  </a:txBody>
+                  <a:tcPr anchor="ctr">
+                    <a:lnL w="12700" cap="flat" cmpd="sng" algn="ctr">
+                      <a:solidFill>
+                        <a:schemeClr val="tx1"/>
+                      </a:solidFill>
+                      <a:prstDash val="solid"/>
+                      <a:round/>
+                      <a:headEnd type="none" w="med" len="med"/>
+                      <a:tailEnd type="none" w="med" len="med"/>
+                    </a:lnL>
+                    <a:lnR w="12700" cap="flat" cmpd="sng" algn="ctr">
+                      <a:solidFill>
+                        <a:schemeClr val="tx1"/>
+                      </a:solidFill>
+                      <a:prstDash val="solid"/>
+                      <a:round/>
+                      <a:headEnd type="none" w="med" len="med"/>
+                      <a:tailEnd type="none" w="med" len="med"/>
+                    </a:lnR>
+                    <a:lnT w="12700" cap="flat" cmpd="sng" algn="ctr">
+                      <a:solidFill>
+                        <a:schemeClr val="tx1"/>
+                      </a:solidFill>
+                      <a:prstDash val="solid"/>
+                      <a:round/>
+                      <a:headEnd type="none" w="med" len="med"/>
+                      <a:tailEnd type="none" w="med" len="med"/>
+                    </a:lnT>
+                    <a:lnB w="12700" cap="flat" cmpd="sng" algn="ctr">
+                      <a:solidFill>
+                        <a:schemeClr val="tx1"/>
+                      </a:solidFill>
+                      <a:prstDash val="solid"/>
+                      <a:round/>
+                      <a:headEnd type="none" w="med" len="med"/>
+                      <a:tailEnd type="none" w="med" len="med"/>
+                    </a:lnB>
+                    <a:lnTlToBr w="12700" cmpd="sng">
+                      <a:noFill/>
+                      <a:prstDash val="solid"/>
+                    </a:lnTlToBr>
+                    <a:lnBlToTr w="12700" cmpd="sng">
+                      <a:noFill/>
+                      <a:prstDash val="solid"/>
+                    </a:lnBlToTr>
+                  </a:tcPr>
+                </a:tc>
+                <a:tc>
+                  <a:txBody>
+                    <a:bodyPr/>
+                    <a:lstStyle/>
+                    <a:p>
+                      <a:pPr marL="0" marR="0" indent="0" algn="ctr" defTabSz="914400" rtl="0" eaLnBrk="1" fontAlgn="auto" latinLnBrk="0" hangingPunct="1">
+                        <a:lnSpc>
+                          <a:spcPct val="100000"/>
+                        </a:lnSpc>
+                        <a:spcBef>
+                          <a:spcPts val="0"/>
+                        </a:spcBef>
+                        <a:spcAft>
+                          <a:spcPts val="0"/>
+                        </a:spcAft>
+                        <a:buClrTx/>
+                        <a:buSzTx/>
+                        <a:buFontTx/>
+                        <a:buNone/>
+                        <a:tabLst/>
+                        <a:defRPr/>
+                      </a:pPr>
+                      <a:r>
+                        <a:rPr lang="en-IN" sz="2000" b="0" dirty="0" smtClean="0">
+                          <a:latin typeface="Cambria" pitchFamily="18" charset="0"/>
+                          <a:ea typeface="Cambria" pitchFamily="18" charset="0"/>
+                        </a:rPr>
+                        <a:t>Floor Division</a:t>
+                      </a:r>
                       <a:endParaRPr lang="en-US" sz="2000" b="0" dirty="0" smtClean="0">
                         <a:latin typeface="Cambria" pitchFamily="18" charset="0"/>
                         <a:ea typeface="Cambria" pitchFamily="18" charset="0"/>
@@ -4749,6 +5664,1144 @@
 </file>
 
 <file path=ppt/slides/slide5.xml><?xml version="1.0" encoding="utf-8"?>
+<p:sld xmlns:a="http://schemas.openxmlformats.org/drawingml/2006/main" xmlns:r="http://schemas.openxmlformats.org/officeDocument/2006/relationships" xmlns:p="http://schemas.openxmlformats.org/presentationml/2006/main">
+  <p:cSld>
+    <p:spTree>
+      <p:nvGrpSpPr>
+        <p:cNvPr id="1" name=""/>
+        <p:cNvGrpSpPr/>
+        <p:nvPr/>
+      </p:nvGrpSpPr>
+      <p:grpSpPr>
+        <a:xfrm>
+          <a:off x="0" y="0"/>
+          <a:ext cx="0" cy="0"/>
+          <a:chOff x="0" y="0"/>
+          <a:chExt cx="0" cy="0"/>
+        </a:xfrm>
+      </p:grpSpPr>
+      <p:sp>
+        <p:nvSpPr>
+          <p:cNvPr id="2" name="Title 1"/>
+          <p:cNvSpPr>
+            <a:spLocks noGrp="1"/>
+          </p:cNvSpPr>
+          <p:nvPr>
+            <p:ph type="title"/>
+          </p:nvPr>
+        </p:nvSpPr>
+        <p:spPr/>
+        <p:txBody>
+          <a:bodyPr/>
+          <a:lstStyle/>
+          <a:p>
+            <a:r>
+              <a:rPr lang="en-IN" dirty="0" smtClean="0"/>
+              <a:t>Relational Operator</a:t>
+            </a:r>
+            <a:endParaRPr lang="en-US" dirty="0"/>
+          </a:p>
+        </p:txBody>
+      </p:sp>
+      <p:sp>
+        <p:nvSpPr>
+          <p:cNvPr id="4" name="Content Placeholder 4"/>
+          <p:cNvSpPr>
+            <a:spLocks noGrp="1"/>
+          </p:cNvSpPr>
+          <p:nvPr>
+            <p:ph idx="1"/>
+          </p:nvPr>
+        </p:nvSpPr>
+        <p:spPr>
+          <a:xfrm>
+            <a:off x="457200" y="1600201"/>
+            <a:ext cx="8186766" cy="1042982"/>
+          </a:xfrm>
+        </p:spPr>
+        <p:txBody>
+          <a:bodyPr>
+            <a:normAutofit lnSpcReduction="10000"/>
+          </a:bodyPr>
+          <a:lstStyle/>
+          <a:p>
+            <a:r>
+              <a:rPr lang="en-IN" dirty="0" smtClean="0"/>
+              <a:t>It is used to compare the operands and gives true or false answers</a:t>
+            </a:r>
+            <a:endParaRPr lang="en-US" dirty="0"/>
+          </a:p>
+        </p:txBody>
+      </p:sp>
+      <p:graphicFrame>
+        <p:nvGraphicFramePr>
+          <p:cNvPr id="5" name="Table 4"/>
+          <p:cNvGraphicFramePr>
+            <a:graphicFrameLocks noGrp="1"/>
+          </p:cNvGraphicFramePr>
+          <p:nvPr/>
+        </p:nvGraphicFramePr>
+        <p:xfrm>
+          <a:off x="2786019" y="2788936"/>
+          <a:ext cx="3786245" cy="3569022"/>
+        </p:xfrm>
+        <a:graphic>
+          <a:graphicData uri="http://schemas.openxmlformats.org/drawingml/2006/table">
+            <a:tbl>
+              <a:tblPr firstRow="1" bandRow="1">
+                <a:tableStyleId>{2D5ABB26-0587-4C30-8999-92F81FD0307C}</a:tableStyleId>
+              </a:tblPr>
+              <a:tblGrid>
+                <a:gridCol w="1262082"/>
+                <a:gridCol w="2524163"/>
+              </a:tblGrid>
+              <a:tr h="477997">
+                <a:tc>
+                  <a:txBody>
+                    <a:bodyPr/>
+                    <a:lstStyle/>
+                    <a:p>
+                      <a:pPr algn="ctr"/>
+                      <a:r>
+                        <a:rPr lang="en-IN" sz="2000" b="1" dirty="0" smtClean="0">
+                          <a:latin typeface="Cambria" pitchFamily="18" charset="0"/>
+                          <a:ea typeface="Cambria" pitchFamily="18" charset="0"/>
+                        </a:rPr>
+                        <a:t>Operator</a:t>
+                      </a:r>
+                      <a:endParaRPr lang="en-US" sz="2000" b="1" dirty="0">
+                        <a:latin typeface="Cambria" pitchFamily="18" charset="0"/>
+                        <a:ea typeface="Cambria" pitchFamily="18" charset="0"/>
+                      </a:endParaRPr>
+                    </a:p>
+                  </a:txBody>
+                  <a:tcPr anchor="ctr">
+                    <a:lnL w="12700" cap="flat" cmpd="sng" algn="ctr">
+                      <a:solidFill>
+                        <a:schemeClr val="tx1"/>
+                      </a:solidFill>
+                      <a:prstDash val="solid"/>
+                      <a:round/>
+                      <a:headEnd type="none" w="med" len="med"/>
+                      <a:tailEnd type="none" w="med" len="med"/>
+                    </a:lnL>
+                    <a:lnR w="12700" cap="flat" cmpd="sng" algn="ctr">
+                      <a:solidFill>
+                        <a:schemeClr val="tx1"/>
+                      </a:solidFill>
+                      <a:prstDash val="solid"/>
+                      <a:round/>
+                      <a:headEnd type="none" w="med" len="med"/>
+                      <a:tailEnd type="none" w="med" len="med"/>
+                    </a:lnR>
+                    <a:lnT w="12700" cap="flat" cmpd="sng" algn="ctr">
+                      <a:solidFill>
+                        <a:schemeClr val="tx1"/>
+                      </a:solidFill>
+                      <a:prstDash val="solid"/>
+                      <a:round/>
+                      <a:headEnd type="none" w="med" len="med"/>
+                      <a:tailEnd type="none" w="med" len="med"/>
+                    </a:lnT>
+                    <a:lnB w="12700" cap="flat" cmpd="sng" algn="ctr">
+                      <a:solidFill>
+                        <a:schemeClr val="tx1"/>
+                      </a:solidFill>
+                      <a:prstDash val="solid"/>
+                      <a:round/>
+                      <a:headEnd type="none" w="med" len="med"/>
+                      <a:tailEnd type="none" w="med" len="med"/>
+                    </a:lnB>
+                    <a:lnTlToBr w="12700" cmpd="sng">
+                      <a:noFill/>
+                      <a:prstDash val="solid"/>
+                    </a:lnTlToBr>
+                    <a:lnBlToTr w="12700" cmpd="sng">
+                      <a:noFill/>
+                      <a:prstDash val="solid"/>
+                    </a:lnBlToTr>
+                  </a:tcPr>
+                </a:tc>
+                <a:tc>
+                  <a:txBody>
+                    <a:bodyPr/>
+                    <a:lstStyle/>
+                    <a:p>
+                      <a:pPr algn="ctr"/>
+                      <a:r>
+                        <a:rPr lang="en-IN" sz="2000" b="1" dirty="0" smtClean="0">
+                          <a:latin typeface="Cambria" pitchFamily="18" charset="0"/>
+                          <a:ea typeface="Cambria" pitchFamily="18" charset="0"/>
+                        </a:rPr>
+                        <a:t>Description</a:t>
+                      </a:r>
+                      <a:endParaRPr lang="en-US" sz="2000" b="1" dirty="0">
+                        <a:latin typeface="Cambria" pitchFamily="18" charset="0"/>
+                        <a:ea typeface="Cambria" pitchFamily="18" charset="0"/>
+                      </a:endParaRPr>
+                    </a:p>
+                  </a:txBody>
+                  <a:tcPr anchor="ctr">
+                    <a:lnL w="12700" cap="flat" cmpd="sng" algn="ctr">
+                      <a:solidFill>
+                        <a:schemeClr val="tx1"/>
+                      </a:solidFill>
+                      <a:prstDash val="solid"/>
+                      <a:round/>
+                      <a:headEnd type="none" w="med" len="med"/>
+                      <a:tailEnd type="none" w="med" len="med"/>
+                    </a:lnL>
+                    <a:lnR w="12700" cap="flat" cmpd="sng" algn="ctr">
+                      <a:solidFill>
+                        <a:schemeClr val="tx1"/>
+                      </a:solidFill>
+                      <a:prstDash val="solid"/>
+                      <a:round/>
+                      <a:headEnd type="none" w="med" len="med"/>
+                      <a:tailEnd type="none" w="med" len="med"/>
+                    </a:lnR>
+                    <a:lnT w="12700" cap="flat" cmpd="sng" algn="ctr">
+                      <a:solidFill>
+                        <a:schemeClr val="tx1"/>
+                      </a:solidFill>
+                      <a:prstDash val="solid"/>
+                      <a:round/>
+                      <a:headEnd type="none" w="med" len="med"/>
+                      <a:tailEnd type="none" w="med" len="med"/>
+                    </a:lnT>
+                    <a:lnB w="12700" cap="flat" cmpd="sng" algn="ctr">
+                      <a:solidFill>
+                        <a:schemeClr val="tx1"/>
+                      </a:solidFill>
+                      <a:prstDash val="solid"/>
+                      <a:round/>
+                      <a:headEnd type="none" w="med" len="med"/>
+                      <a:tailEnd type="none" w="med" len="med"/>
+                    </a:lnB>
+                    <a:lnTlToBr w="12700" cmpd="sng">
+                      <a:noFill/>
+                      <a:prstDash val="solid"/>
+                    </a:lnTlToBr>
+                    <a:lnBlToTr w="12700" cmpd="sng">
+                      <a:noFill/>
+                      <a:prstDash val="solid"/>
+                    </a:lnBlToTr>
+                  </a:tcPr>
+                </a:tc>
+              </a:tr>
+              <a:tr h="477997">
+                <a:tc>
+                  <a:txBody>
+                    <a:bodyPr/>
+                    <a:lstStyle/>
+                    <a:p>
+                      <a:pPr algn="ctr"/>
+                      <a:r>
+                        <a:rPr lang="en-IN" sz="2000" b="0" dirty="0" smtClean="0">
+                          <a:latin typeface="Cambria" pitchFamily="18" charset="0"/>
+                          <a:ea typeface="Cambria" pitchFamily="18" charset="0"/>
+                        </a:rPr>
+                        <a:t>&lt;</a:t>
+                      </a:r>
+                      <a:endParaRPr lang="en-US" sz="2000" b="0" dirty="0">
+                        <a:latin typeface="Cambria" pitchFamily="18" charset="0"/>
+                        <a:ea typeface="Cambria" pitchFamily="18" charset="0"/>
+                      </a:endParaRPr>
+                    </a:p>
+                  </a:txBody>
+                  <a:tcPr anchor="ctr">
+                    <a:lnL w="12700" cap="flat" cmpd="sng" algn="ctr">
+                      <a:solidFill>
+                        <a:schemeClr val="tx1"/>
+                      </a:solidFill>
+                      <a:prstDash val="solid"/>
+                      <a:round/>
+                      <a:headEnd type="none" w="med" len="med"/>
+                      <a:tailEnd type="none" w="med" len="med"/>
+                    </a:lnL>
+                    <a:lnR w="12700" cap="flat" cmpd="sng" algn="ctr">
+                      <a:solidFill>
+                        <a:schemeClr val="tx1"/>
+                      </a:solidFill>
+                      <a:prstDash val="solid"/>
+                      <a:round/>
+                      <a:headEnd type="none" w="med" len="med"/>
+                      <a:tailEnd type="none" w="med" len="med"/>
+                    </a:lnR>
+                    <a:lnT w="12700" cap="flat" cmpd="sng" algn="ctr">
+                      <a:solidFill>
+                        <a:schemeClr val="tx1"/>
+                      </a:solidFill>
+                      <a:prstDash val="solid"/>
+                      <a:round/>
+                      <a:headEnd type="none" w="med" len="med"/>
+                      <a:tailEnd type="none" w="med" len="med"/>
+                    </a:lnT>
+                    <a:lnB w="12700" cap="flat" cmpd="sng" algn="ctr">
+                      <a:solidFill>
+                        <a:schemeClr val="tx1"/>
+                      </a:solidFill>
+                      <a:prstDash val="solid"/>
+                      <a:round/>
+                      <a:headEnd type="none" w="med" len="med"/>
+                      <a:tailEnd type="none" w="med" len="med"/>
+                    </a:lnB>
+                    <a:lnTlToBr w="12700" cmpd="sng">
+                      <a:noFill/>
+                      <a:prstDash val="solid"/>
+                    </a:lnTlToBr>
+                    <a:lnBlToTr w="12700" cmpd="sng">
+                      <a:noFill/>
+                      <a:prstDash val="solid"/>
+                    </a:lnBlToTr>
+                  </a:tcPr>
+                </a:tc>
+                <a:tc>
+                  <a:txBody>
+                    <a:bodyPr/>
+                    <a:lstStyle/>
+                    <a:p>
+                      <a:pPr marL="0" marR="0" indent="0" algn="ctr" defTabSz="914400" rtl="0" eaLnBrk="1" fontAlgn="auto" latinLnBrk="0" hangingPunct="1">
+                        <a:lnSpc>
+                          <a:spcPct val="100000"/>
+                        </a:lnSpc>
+                        <a:spcBef>
+                          <a:spcPts val="0"/>
+                        </a:spcBef>
+                        <a:spcAft>
+                          <a:spcPts val="0"/>
+                        </a:spcAft>
+                        <a:buClrTx/>
+                        <a:buSzTx/>
+                        <a:buFontTx/>
+                        <a:buNone/>
+                        <a:tabLst/>
+                        <a:defRPr/>
+                      </a:pPr>
+                      <a:r>
+                        <a:rPr lang="en-IN" sz="2000" b="0" dirty="0" smtClean="0">
+                          <a:latin typeface="Cambria" pitchFamily="18" charset="0"/>
+                          <a:ea typeface="Cambria" pitchFamily="18" charset="0"/>
+                        </a:rPr>
+                        <a:t>Less than</a:t>
+                      </a:r>
+                      <a:endParaRPr lang="en-US" sz="2000" b="0" dirty="0" smtClean="0">
+                        <a:latin typeface="Cambria" pitchFamily="18" charset="0"/>
+                        <a:ea typeface="Cambria" pitchFamily="18" charset="0"/>
+                      </a:endParaRPr>
+                    </a:p>
+                  </a:txBody>
+                  <a:tcPr anchor="ctr">
+                    <a:lnL w="12700" cap="flat" cmpd="sng" algn="ctr">
+                      <a:solidFill>
+                        <a:schemeClr val="tx1"/>
+                      </a:solidFill>
+                      <a:prstDash val="solid"/>
+                      <a:round/>
+                      <a:headEnd type="none" w="med" len="med"/>
+                      <a:tailEnd type="none" w="med" len="med"/>
+                    </a:lnL>
+                    <a:lnR w="12700" cap="flat" cmpd="sng" algn="ctr">
+                      <a:solidFill>
+                        <a:schemeClr val="tx1"/>
+                      </a:solidFill>
+                      <a:prstDash val="solid"/>
+                      <a:round/>
+                      <a:headEnd type="none" w="med" len="med"/>
+                      <a:tailEnd type="none" w="med" len="med"/>
+                    </a:lnR>
+                    <a:lnT w="12700" cap="flat" cmpd="sng" algn="ctr">
+                      <a:solidFill>
+                        <a:schemeClr val="tx1"/>
+                      </a:solidFill>
+                      <a:prstDash val="solid"/>
+                      <a:round/>
+                      <a:headEnd type="none" w="med" len="med"/>
+                      <a:tailEnd type="none" w="med" len="med"/>
+                    </a:lnT>
+                    <a:lnB w="12700" cap="flat" cmpd="sng" algn="ctr">
+                      <a:solidFill>
+                        <a:schemeClr val="tx1"/>
+                      </a:solidFill>
+                      <a:prstDash val="solid"/>
+                      <a:round/>
+                      <a:headEnd type="none" w="med" len="med"/>
+                      <a:tailEnd type="none" w="med" len="med"/>
+                    </a:lnB>
+                    <a:lnTlToBr w="12700" cmpd="sng">
+                      <a:noFill/>
+                      <a:prstDash val="solid"/>
+                    </a:lnTlToBr>
+                    <a:lnBlToTr w="12700" cmpd="sng">
+                      <a:noFill/>
+                      <a:prstDash val="solid"/>
+                    </a:lnBlToTr>
+                  </a:tcPr>
+                </a:tc>
+              </a:tr>
+              <a:tr h="477997">
+                <a:tc>
+                  <a:txBody>
+                    <a:bodyPr/>
+                    <a:lstStyle/>
+                    <a:p>
+                      <a:pPr algn="ctr"/>
+                      <a:r>
+                        <a:rPr lang="en-IN" sz="2000" b="0" dirty="0" smtClean="0">
+                          <a:latin typeface="Cambria" pitchFamily="18" charset="0"/>
+                          <a:ea typeface="Cambria" pitchFamily="18" charset="0"/>
+                        </a:rPr>
+                        <a:t>&gt;</a:t>
+                      </a:r>
+                      <a:endParaRPr lang="en-US" sz="2000" b="0" dirty="0">
+                        <a:latin typeface="Cambria" pitchFamily="18" charset="0"/>
+                        <a:ea typeface="Cambria" pitchFamily="18" charset="0"/>
+                      </a:endParaRPr>
+                    </a:p>
+                  </a:txBody>
+                  <a:tcPr anchor="ctr">
+                    <a:lnL w="12700" cap="flat" cmpd="sng" algn="ctr">
+                      <a:solidFill>
+                        <a:schemeClr val="tx1"/>
+                      </a:solidFill>
+                      <a:prstDash val="solid"/>
+                      <a:round/>
+                      <a:headEnd type="none" w="med" len="med"/>
+                      <a:tailEnd type="none" w="med" len="med"/>
+                    </a:lnL>
+                    <a:lnR w="12700" cap="flat" cmpd="sng" algn="ctr">
+                      <a:solidFill>
+                        <a:schemeClr val="tx1"/>
+                      </a:solidFill>
+                      <a:prstDash val="solid"/>
+                      <a:round/>
+                      <a:headEnd type="none" w="med" len="med"/>
+                      <a:tailEnd type="none" w="med" len="med"/>
+                    </a:lnR>
+                    <a:lnT w="12700" cap="flat" cmpd="sng" algn="ctr">
+                      <a:solidFill>
+                        <a:schemeClr val="tx1"/>
+                      </a:solidFill>
+                      <a:prstDash val="solid"/>
+                      <a:round/>
+                      <a:headEnd type="none" w="med" len="med"/>
+                      <a:tailEnd type="none" w="med" len="med"/>
+                    </a:lnT>
+                    <a:lnB w="12700" cap="flat" cmpd="sng" algn="ctr">
+                      <a:solidFill>
+                        <a:schemeClr val="tx1"/>
+                      </a:solidFill>
+                      <a:prstDash val="solid"/>
+                      <a:round/>
+                      <a:headEnd type="none" w="med" len="med"/>
+                      <a:tailEnd type="none" w="med" len="med"/>
+                    </a:lnB>
+                    <a:lnTlToBr w="12700" cmpd="sng">
+                      <a:noFill/>
+                      <a:prstDash val="solid"/>
+                    </a:lnTlToBr>
+                    <a:lnBlToTr w="12700" cmpd="sng">
+                      <a:noFill/>
+                      <a:prstDash val="solid"/>
+                    </a:lnBlToTr>
+                  </a:tcPr>
+                </a:tc>
+                <a:tc>
+                  <a:txBody>
+                    <a:bodyPr/>
+                    <a:lstStyle/>
+                    <a:p>
+                      <a:pPr marL="0" marR="0" indent="0" algn="ctr" defTabSz="914400" rtl="0" eaLnBrk="1" fontAlgn="auto" latinLnBrk="0" hangingPunct="1">
+                        <a:lnSpc>
+                          <a:spcPct val="100000"/>
+                        </a:lnSpc>
+                        <a:spcBef>
+                          <a:spcPts val="0"/>
+                        </a:spcBef>
+                        <a:spcAft>
+                          <a:spcPts val="0"/>
+                        </a:spcAft>
+                        <a:buClrTx/>
+                        <a:buSzTx/>
+                        <a:buFontTx/>
+                        <a:buNone/>
+                        <a:tabLst/>
+                        <a:defRPr/>
+                      </a:pPr>
+                      <a:r>
+                        <a:rPr lang="en-IN" sz="2000" b="0" dirty="0" smtClean="0">
+                          <a:latin typeface="Cambria" pitchFamily="18" charset="0"/>
+                          <a:ea typeface="Cambria" pitchFamily="18" charset="0"/>
+                        </a:rPr>
+                        <a:t>Greater than</a:t>
+                      </a:r>
+                      <a:endParaRPr lang="en-US" sz="2000" b="0" dirty="0" smtClean="0">
+                        <a:latin typeface="Cambria" pitchFamily="18" charset="0"/>
+                        <a:ea typeface="Cambria" pitchFamily="18" charset="0"/>
+                      </a:endParaRPr>
+                    </a:p>
+                  </a:txBody>
+                  <a:tcPr anchor="ctr">
+                    <a:lnL w="12700" cap="flat" cmpd="sng" algn="ctr">
+                      <a:solidFill>
+                        <a:schemeClr val="tx1"/>
+                      </a:solidFill>
+                      <a:prstDash val="solid"/>
+                      <a:round/>
+                      <a:headEnd type="none" w="med" len="med"/>
+                      <a:tailEnd type="none" w="med" len="med"/>
+                    </a:lnL>
+                    <a:lnR w="12700" cap="flat" cmpd="sng" algn="ctr">
+                      <a:solidFill>
+                        <a:schemeClr val="tx1"/>
+                      </a:solidFill>
+                      <a:prstDash val="solid"/>
+                      <a:round/>
+                      <a:headEnd type="none" w="med" len="med"/>
+                      <a:tailEnd type="none" w="med" len="med"/>
+                    </a:lnR>
+                    <a:lnT w="12700" cap="flat" cmpd="sng" algn="ctr">
+                      <a:solidFill>
+                        <a:schemeClr val="tx1"/>
+                      </a:solidFill>
+                      <a:prstDash val="solid"/>
+                      <a:round/>
+                      <a:headEnd type="none" w="med" len="med"/>
+                      <a:tailEnd type="none" w="med" len="med"/>
+                    </a:lnT>
+                    <a:lnB w="12700" cap="flat" cmpd="sng" algn="ctr">
+                      <a:solidFill>
+                        <a:schemeClr val="tx1"/>
+                      </a:solidFill>
+                      <a:prstDash val="solid"/>
+                      <a:round/>
+                      <a:headEnd type="none" w="med" len="med"/>
+                      <a:tailEnd type="none" w="med" len="med"/>
+                    </a:lnB>
+                    <a:lnTlToBr w="12700" cmpd="sng">
+                      <a:noFill/>
+                      <a:prstDash val="solid"/>
+                    </a:lnTlToBr>
+                    <a:lnBlToTr w="12700" cmpd="sng">
+                      <a:noFill/>
+                      <a:prstDash val="solid"/>
+                    </a:lnBlToTr>
+                  </a:tcPr>
+                </a:tc>
+              </a:tr>
+              <a:tr h="477997">
+                <a:tc>
+                  <a:txBody>
+                    <a:bodyPr/>
+                    <a:lstStyle/>
+                    <a:p>
+                      <a:pPr algn="ctr"/>
+                      <a:r>
+                        <a:rPr lang="en-IN" sz="2000" b="0" dirty="0" smtClean="0">
+                          <a:latin typeface="Cambria" pitchFamily="18" charset="0"/>
+                          <a:ea typeface="Cambria" pitchFamily="18" charset="0"/>
+                        </a:rPr>
+                        <a:t>&lt;=</a:t>
+                      </a:r>
+                      <a:endParaRPr lang="en-US" sz="2000" b="0" dirty="0">
+                        <a:latin typeface="Cambria" pitchFamily="18" charset="0"/>
+                        <a:ea typeface="Cambria" pitchFamily="18" charset="0"/>
+                      </a:endParaRPr>
+                    </a:p>
+                  </a:txBody>
+                  <a:tcPr anchor="ctr">
+                    <a:lnL w="12700" cap="flat" cmpd="sng" algn="ctr">
+                      <a:solidFill>
+                        <a:schemeClr val="tx1"/>
+                      </a:solidFill>
+                      <a:prstDash val="solid"/>
+                      <a:round/>
+                      <a:headEnd type="none" w="med" len="med"/>
+                      <a:tailEnd type="none" w="med" len="med"/>
+                    </a:lnL>
+                    <a:lnR w="12700" cap="flat" cmpd="sng" algn="ctr">
+                      <a:solidFill>
+                        <a:schemeClr val="tx1"/>
+                      </a:solidFill>
+                      <a:prstDash val="solid"/>
+                      <a:round/>
+                      <a:headEnd type="none" w="med" len="med"/>
+                      <a:tailEnd type="none" w="med" len="med"/>
+                    </a:lnR>
+                    <a:lnT w="12700" cap="flat" cmpd="sng" algn="ctr">
+                      <a:solidFill>
+                        <a:schemeClr val="tx1"/>
+                      </a:solidFill>
+                      <a:prstDash val="solid"/>
+                      <a:round/>
+                      <a:headEnd type="none" w="med" len="med"/>
+                      <a:tailEnd type="none" w="med" len="med"/>
+                    </a:lnT>
+                    <a:lnB w="12700" cap="flat" cmpd="sng" algn="ctr">
+                      <a:solidFill>
+                        <a:schemeClr val="tx1"/>
+                      </a:solidFill>
+                      <a:prstDash val="solid"/>
+                      <a:round/>
+                      <a:headEnd type="none" w="med" len="med"/>
+                      <a:tailEnd type="none" w="med" len="med"/>
+                    </a:lnB>
+                    <a:lnTlToBr w="12700" cmpd="sng">
+                      <a:noFill/>
+                      <a:prstDash val="solid"/>
+                    </a:lnTlToBr>
+                    <a:lnBlToTr w="12700" cmpd="sng">
+                      <a:noFill/>
+                      <a:prstDash val="solid"/>
+                    </a:lnBlToTr>
+                  </a:tcPr>
+                </a:tc>
+                <a:tc>
+                  <a:txBody>
+                    <a:bodyPr/>
+                    <a:lstStyle/>
+                    <a:p>
+                      <a:pPr marL="0" marR="0" indent="0" algn="ctr" defTabSz="914400" rtl="0" eaLnBrk="1" fontAlgn="auto" latinLnBrk="0" hangingPunct="1">
+                        <a:lnSpc>
+                          <a:spcPct val="100000"/>
+                        </a:lnSpc>
+                        <a:spcBef>
+                          <a:spcPts val="0"/>
+                        </a:spcBef>
+                        <a:spcAft>
+                          <a:spcPts val="0"/>
+                        </a:spcAft>
+                        <a:buClrTx/>
+                        <a:buSzTx/>
+                        <a:buFontTx/>
+                        <a:buNone/>
+                        <a:tabLst/>
+                        <a:defRPr/>
+                      </a:pPr>
+                      <a:r>
+                        <a:rPr lang="en-IN" sz="2000" b="0" dirty="0" smtClean="0">
+                          <a:latin typeface="Cambria" pitchFamily="18" charset="0"/>
+                          <a:ea typeface="Cambria" pitchFamily="18" charset="0"/>
+                        </a:rPr>
+                        <a:t>Less than or equals</a:t>
+                      </a:r>
+                      <a:endParaRPr lang="en-US" sz="2000" b="0" dirty="0" smtClean="0">
+                        <a:latin typeface="Cambria" pitchFamily="18" charset="0"/>
+                        <a:ea typeface="Cambria" pitchFamily="18" charset="0"/>
+                      </a:endParaRPr>
+                    </a:p>
+                  </a:txBody>
+                  <a:tcPr anchor="ctr">
+                    <a:lnL w="12700" cap="flat" cmpd="sng" algn="ctr">
+                      <a:solidFill>
+                        <a:schemeClr val="tx1"/>
+                      </a:solidFill>
+                      <a:prstDash val="solid"/>
+                      <a:round/>
+                      <a:headEnd type="none" w="med" len="med"/>
+                      <a:tailEnd type="none" w="med" len="med"/>
+                    </a:lnL>
+                    <a:lnR w="12700" cap="flat" cmpd="sng" algn="ctr">
+                      <a:solidFill>
+                        <a:schemeClr val="tx1"/>
+                      </a:solidFill>
+                      <a:prstDash val="solid"/>
+                      <a:round/>
+                      <a:headEnd type="none" w="med" len="med"/>
+                      <a:tailEnd type="none" w="med" len="med"/>
+                    </a:lnR>
+                    <a:lnT w="12700" cap="flat" cmpd="sng" algn="ctr">
+                      <a:solidFill>
+                        <a:schemeClr val="tx1"/>
+                      </a:solidFill>
+                      <a:prstDash val="solid"/>
+                      <a:round/>
+                      <a:headEnd type="none" w="med" len="med"/>
+                      <a:tailEnd type="none" w="med" len="med"/>
+                    </a:lnT>
+                    <a:lnB w="12700" cap="flat" cmpd="sng" algn="ctr">
+                      <a:solidFill>
+                        <a:schemeClr val="tx1"/>
+                      </a:solidFill>
+                      <a:prstDash val="solid"/>
+                      <a:round/>
+                      <a:headEnd type="none" w="med" len="med"/>
+                      <a:tailEnd type="none" w="med" len="med"/>
+                    </a:lnB>
+                    <a:lnTlToBr w="12700" cmpd="sng">
+                      <a:noFill/>
+                      <a:prstDash val="solid"/>
+                    </a:lnTlToBr>
+                    <a:lnBlToTr w="12700" cmpd="sng">
+                      <a:noFill/>
+                      <a:prstDash val="solid"/>
+                    </a:lnBlToTr>
+                  </a:tcPr>
+                </a:tc>
+              </a:tr>
+              <a:tr h="477997">
+                <a:tc>
+                  <a:txBody>
+                    <a:bodyPr/>
+                    <a:lstStyle/>
+                    <a:p>
+                      <a:pPr algn="ctr"/>
+                      <a:r>
+                        <a:rPr lang="en-IN" sz="2000" b="0" dirty="0" smtClean="0">
+                          <a:latin typeface="Cambria" pitchFamily="18" charset="0"/>
+                          <a:ea typeface="Cambria" pitchFamily="18" charset="0"/>
+                        </a:rPr>
+                        <a:t>&gt;=</a:t>
+                      </a:r>
+                      <a:endParaRPr lang="en-US" sz="2000" b="0" dirty="0">
+                        <a:latin typeface="Cambria" pitchFamily="18" charset="0"/>
+                        <a:ea typeface="Cambria" pitchFamily="18" charset="0"/>
+                      </a:endParaRPr>
+                    </a:p>
+                  </a:txBody>
+                  <a:tcPr anchor="ctr">
+                    <a:lnL w="12700" cap="flat" cmpd="sng" algn="ctr">
+                      <a:solidFill>
+                        <a:schemeClr val="tx1"/>
+                      </a:solidFill>
+                      <a:prstDash val="solid"/>
+                      <a:round/>
+                      <a:headEnd type="none" w="med" len="med"/>
+                      <a:tailEnd type="none" w="med" len="med"/>
+                    </a:lnL>
+                    <a:lnR w="12700" cap="flat" cmpd="sng" algn="ctr">
+                      <a:solidFill>
+                        <a:schemeClr val="tx1"/>
+                      </a:solidFill>
+                      <a:prstDash val="solid"/>
+                      <a:round/>
+                      <a:headEnd type="none" w="med" len="med"/>
+                      <a:tailEnd type="none" w="med" len="med"/>
+                    </a:lnR>
+                    <a:lnT w="12700" cap="flat" cmpd="sng" algn="ctr">
+                      <a:solidFill>
+                        <a:schemeClr val="tx1"/>
+                      </a:solidFill>
+                      <a:prstDash val="solid"/>
+                      <a:round/>
+                      <a:headEnd type="none" w="med" len="med"/>
+                      <a:tailEnd type="none" w="med" len="med"/>
+                    </a:lnT>
+                    <a:lnB w="12700" cap="flat" cmpd="sng" algn="ctr">
+                      <a:solidFill>
+                        <a:schemeClr val="tx1"/>
+                      </a:solidFill>
+                      <a:prstDash val="solid"/>
+                      <a:round/>
+                      <a:headEnd type="none" w="med" len="med"/>
+                      <a:tailEnd type="none" w="med" len="med"/>
+                    </a:lnB>
+                    <a:lnTlToBr w="12700" cmpd="sng">
+                      <a:noFill/>
+                      <a:prstDash val="solid"/>
+                    </a:lnTlToBr>
+                    <a:lnBlToTr w="12700" cmpd="sng">
+                      <a:noFill/>
+                      <a:prstDash val="solid"/>
+                    </a:lnBlToTr>
+                  </a:tcPr>
+                </a:tc>
+                <a:tc>
+                  <a:txBody>
+                    <a:bodyPr/>
+                    <a:lstStyle/>
+                    <a:p>
+                      <a:pPr marL="0" marR="0" indent="0" algn="ctr" defTabSz="914400" rtl="0" eaLnBrk="1" fontAlgn="auto" latinLnBrk="0" hangingPunct="1">
+                        <a:lnSpc>
+                          <a:spcPct val="100000"/>
+                        </a:lnSpc>
+                        <a:spcBef>
+                          <a:spcPts val="0"/>
+                        </a:spcBef>
+                        <a:spcAft>
+                          <a:spcPts val="0"/>
+                        </a:spcAft>
+                        <a:buClrTx/>
+                        <a:buSzTx/>
+                        <a:buFontTx/>
+                        <a:buNone/>
+                        <a:tabLst/>
+                        <a:defRPr/>
+                      </a:pPr>
+                      <a:r>
+                        <a:rPr lang="en-IN" sz="2000" b="0" dirty="0" smtClean="0">
+                          <a:latin typeface="Cambria" pitchFamily="18" charset="0"/>
+                          <a:ea typeface="Cambria" pitchFamily="18" charset="0"/>
+                        </a:rPr>
+                        <a:t>Greater than or equals</a:t>
+                      </a:r>
+                      <a:endParaRPr lang="en-US" sz="2000" b="0" dirty="0" smtClean="0">
+                        <a:latin typeface="Cambria" pitchFamily="18" charset="0"/>
+                        <a:ea typeface="Cambria" pitchFamily="18" charset="0"/>
+                      </a:endParaRPr>
+                    </a:p>
+                  </a:txBody>
+                  <a:tcPr anchor="ctr">
+                    <a:lnL w="12700" cap="flat" cmpd="sng" algn="ctr">
+                      <a:solidFill>
+                        <a:schemeClr val="tx1"/>
+                      </a:solidFill>
+                      <a:prstDash val="solid"/>
+                      <a:round/>
+                      <a:headEnd type="none" w="med" len="med"/>
+                      <a:tailEnd type="none" w="med" len="med"/>
+                    </a:lnL>
+                    <a:lnR w="12700" cap="flat" cmpd="sng" algn="ctr">
+                      <a:solidFill>
+                        <a:schemeClr val="tx1"/>
+                      </a:solidFill>
+                      <a:prstDash val="solid"/>
+                      <a:round/>
+                      <a:headEnd type="none" w="med" len="med"/>
+                      <a:tailEnd type="none" w="med" len="med"/>
+                    </a:lnR>
+                    <a:lnT w="12700" cap="flat" cmpd="sng" algn="ctr">
+                      <a:solidFill>
+                        <a:schemeClr val="tx1"/>
+                      </a:solidFill>
+                      <a:prstDash val="solid"/>
+                      <a:round/>
+                      <a:headEnd type="none" w="med" len="med"/>
+                      <a:tailEnd type="none" w="med" len="med"/>
+                    </a:lnT>
+                    <a:lnB w="12700" cap="flat" cmpd="sng" algn="ctr">
+                      <a:solidFill>
+                        <a:schemeClr val="tx1"/>
+                      </a:solidFill>
+                      <a:prstDash val="solid"/>
+                      <a:round/>
+                      <a:headEnd type="none" w="med" len="med"/>
+                      <a:tailEnd type="none" w="med" len="med"/>
+                    </a:lnB>
+                    <a:lnTlToBr w="12700" cmpd="sng">
+                      <a:noFill/>
+                      <a:prstDash val="solid"/>
+                    </a:lnTlToBr>
+                    <a:lnBlToTr w="12700" cmpd="sng">
+                      <a:noFill/>
+                      <a:prstDash val="solid"/>
+                    </a:lnBlToTr>
+                  </a:tcPr>
+                </a:tc>
+              </a:tr>
+              <a:tr h="477997">
+                <a:tc>
+                  <a:txBody>
+                    <a:bodyPr/>
+                    <a:lstStyle/>
+                    <a:p>
+                      <a:pPr algn="ctr"/>
+                      <a:r>
+                        <a:rPr lang="en-IN" sz="2000" b="0" dirty="0" smtClean="0">
+                          <a:latin typeface="Cambria" pitchFamily="18" charset="0"/>
+                          <a:ea typeface="Cambria" pitchFamily="18" charset="0"/>
+                        </a:rPr>
+                        <a:t>==</a:t>
+                      </a:r>
+                      <a:endParaRPr lang="en-US" sz="2000" b="0" dirty="0">
+                        <a:latin typeface="Cambria" pitchFamily="18" charset="0"/>
+                        <a:ea typeface="Cambria" pitchFamily="18" charset="0"/>
+                      </a:endParaRPr>
+                    </a:p>
+                  </a:txBody>
+                  <a:tcPr anchor="ctr">
+                    <a:lnL w="12700" cap="flat" cmpd="sng" algn="ctr">
+                      <a:solidFill>
+                        <a:schemeClr val="tx1"/>
+                      </a:solidFill>
+                      <a:prstDash val="solid"/>
+                      <a:round/>
+                      <a:headEnd type="none" w="med" len="med"/>
+                      <a:tailEnd type="none" w="med" len="med"/>
+                    </a:lnL>
+                    <a:lnR w="12700" cap="flat" cmpd="sng" algn="ctr">
+                      <a:solidFill>
+                        <a:schemeClr val="tx1"/>
+                      </a:solidFill>
+                      <a:prstDash val="solid"/>
+                      <a:round/>
+                      <a:headEnd type="none" w="med" len="med"/>
+                      <a:tailEnd type="none" w="med" len="med"/>
+                    </a:lnR>
+                    <a:lnT w="12700" cap="flat" cmpd="sng" algn="ctr">
+                      <a:solidFill>
+                        <a:schemeClr val="tx1"/>
+                      </a:solidFill>
+                      <a:prstDash val="solid"/>
+                      <a:round/>
+                      <a:headEnd type="none" w="med" len="med"/>
+                      <a:tailEnd type="none" w="med" len="med"/>
+                    </a:lnT>
+                    <a:lnB w="12700" cap="flat" cmpd="sng" algn="ctr">
+                      <a:solidFill>
+                        <a:schemeClr val="tx1"/>
+                      </a:solidFill>
+                      <a:prstDash val="solid"/>
+                      <a:round/>
+                      <a:headEnd type="none" w="med" len="med"/>
+                      <a:tailEnd type="none" w="med" len="med"/>
+                    </a:lnB>
+                    <a:lnTlToBr w="12700" cmpd="sng">
+                      <a:noFill/>
+                      <a:prstDash val="solid"/>
+                    </a:lnTlToBr>
+                    <a:lnBlToTr w="12700" cmpd="sng">
+                      <a:noFill/>
+                      <a:prstDash val="solid"/>
+                    </a:lnBlToTr>
+                  </a:tcPr>
+                </a:tc>
+                <a:tc>
+                  <a:txBody>
+                    <a:bodyPr/>
+                    <a:lstStyle/>
+                    <a:p>
+                      <a:pPr marL="0" marR="0" indent="0" algn="ctr" defTabSz="914400" rtl="0" eaLnBrk="1" fontAlgn="auto" latinLnBrk="0" hangingPunct="1">
+                        <a:lnSpc>
+                          <a:spcPct val="100000"/>
+                        </a:lnSpc>
+                        <a:spcBef>
+                          <a:spcPts val="0"/>
+                        </a:spcBef>
+                        <a:spcAft>
+                          <a:spcPts val="0"/>
+                        </a:spcAft>
+                        <a:buClrTx/>
+                        <a:buSzTx/>
+                        <a:buFontTx/>
+                        <a:buNone/>
+                        <a:tabLst/>
+                        <a:defRPr/>
+                      </a:pPr>
+                      <a:r>
+                        <a:rPr lang="en-IN" sz="2000" b="0" dirty="0" smtClean="0">
+                          <a:latin typeface="Cambria" pitchFamily="18" charset="0"/>
+                          <a:ea typeface="Cambria" pitchFamily="18" charset="0"/>
+                        </a:rPr>
+                        <a:t>Equals</a:t>
+                      </a:r>
+                      <a:endParaRPr lang="en-US" sz="2000" b="0" dirty="0" smtClean="0">
+                        <a:latin typeface="Cambria" pitchFamily="18" charset="0"/>
+                        <a:ea typeface="Cambria" pitchFamily="18" charset="0"/>
+                      </a:endParaRPr>
+                    </a:p>
+                  </a:txBody>
+                  <a:tcPr anchor="ctr">
+                    <a:lnL w="12700" cap="flat" cmpd="sng" algn="ctr">
+                      <a:solidFill>
+                        <a:schemeClr val="tx1"/>
+                      </a:solidFill>
+                      <a:prstDash val="solid"/>
+                      <a:round/>
+                      <a:headEnd type="none" w="med" len="med"/>
+                      <a:tailEnd type="none" w="med" len="med"/>
+                    </a:lnL>
+                    <a:lnR w="12700" cap="flat" cmpd="sng" algn="ctr">
+                      <a:solidFill>
+                        <a:schemeClr val="tx1"/>
+                      </a:solidFill>
+                      <a:prstDash val="solid"/>
+                      <a:round/>
+                      <a:headEnd type="none" w="med" len="med"/>
+                      <a:tailEnd type="none" w="med" len="med"/>
+                    </a:lnR>
+                    <a:lnT w="12700" cap="flat" cmpd="sng" algn="ctr">
+                      <a:solidFill>
+                        <a:schemeClr val="tx1"/>
+                      </a:solidFill>
+                      <a:prstDash val="solid"/>
+                      <a:round/>
+                      <a:headEnd type="none" w="med" len="med"/>
+                      <a:tailEnd type="none" w="med" len="med"/>
+                    </a:lnT>
+                    <a:lnB w="12700" cap="flat" cmpd="sng" algn="ctr">
+                      <a:solidFill>
+                        <a:schemeClr val="tx1"/>
+                      </a:solidFill>
+                      <a:prstDash val="solid"/>
+                      <a:round/>
+                      <a:headEnd type="none" w="med" len="med"/>
+                      <a:tailEnd type="none" w="med" len="med"/>
+                    </a:lnB>
+                    <a:lnTlToBr w="12700" cmpd="sng">
+                      <a:noFill/>
+                      <a:prstDash val="solid"/>
+                    </a:lnTlToBr>
+                    <a:lnBlToTr w="12700" cmpd="sng">
+                      <a:noFill/>
+                      <a:prstDash val="solid"/>
+                    </a:lnBlToTr>
+                  </a:tcPr>
+                </a:tc>
+              </a:tr>
+              <a:tr h="477997">
+                <a:tc>
+                  <a:txBody>
+                    <a:bodyPr/>
+                    <a:lstStyle/>
+                    <a:p>
+                      <a:pPr algn="ctr"/>
+                      <a:r>
+                        <a:rPr lang="en-IN" sz="2000" b="0" dirty="0" smtClean="0">
+                          <a:latin typeface="Cambria" pitchFamily="18" charset="0"/>
+                          <a:ea typeface="Cambria" pitchFamily="18" charset="0"/>
+                        </a:rPr>
+                        <a:t>!=</a:t>
+                      </a:r>
+                      <a:endParaRPr lang="en-US" sz="2000" b="0" dirty="0">
+                        <a:latin typeface="Cambria" pitchFamily="18" charset="0"/>
+                        <a:ea typeface="Cambria" pitchFamily="18" charset="0"/>
+                      </a:endParaRPr>
+                    </a:p>
+                  </a:txBody>
+                  <a:tcPr anchor="ctr">
+                    <a:lnL w="12700" cap="flat" cmpd="sng" algn="ctr">
+                      <a:solidFill>
+                        <a:schemeClr val="tx1"/>
+                      </a:solidFill>
+                      <a:prstDash val="solid"/>
+                      <a:round/>
+                      <a:headEnd type="none" w="med" len="med"/>
+                      <a:tailEnd type="none" w="med" len="med"/>
+                    </a:lnL>
+                    <a:lnR w="12700" cap="flat" cmpd="sng" algn="ctr">
+                      <a:solidFill>
+                        <a:schemeClr val="tx1"/>
+                      </a:solidFill>
+                      <a:prstDash val="solid"/>
+                      <a:round/>
+                      <a:headEnd type="none" w="med" len="med"/>
+                      <a:tailEnd type="none" w="med" len="med"/>
+                    </a:lnR>
+                    <a:lnT w="12700" cap="flat" cmpd="sng" algn="ctr">
+                      <a:solidFill>
+                        <a:schemeClr val="tx1"/>
+                      </a:solidFill>
+                      <a:prstDash val="solid"/>
+                      <a:round/>
+                      <a:headEnd type="none" w="med" len="med"/>
+                      <a:tailEnd type="none" w="med" len="med"/>
+                    </a:lnT>
+                    <a:lnB w="12700" cap="flat" cmpd="sng" algn="ctr">
+                      <a:solidFill>
+                        <a:schemeClr val="tx1"/>
+                      </a:solidFill>
+                      <a:prstDash val="solid"/>
+                      <a:round/>
+                      <a:headEnd type="none" w="med" len="med"/>
+                      <a:tailEnd type="none" w="med" len="med"/>
+                    </a:lnB>
+                    <a:lnTlToBr w="12700" cmpd="sng">
+                      <a:noFill/>
+                      <a:prstDash val="solid"/>
+                    </a:lnTlToBr>
+                    <a:lnBlToTr w="12700" cmpd="sng">
+                      <a:noFill/>
+                      <a:prstDash val="solid"/>
+                    </a:lnBlToTr>
+                  </a:tcPr>
+                </a:tc>
+                <a:tc>
+                  <a:txBody>
+                    <a:bodyPr/>
+                    <a:lstStyle/>
+                    <a:p>
+                      <a:pPr marL="0" marR="0" indent="0" algn="ctr" defTabSz="914400" rtl="0" eaLnBrk="1" fontAlgn="auto" latinLnBrk="0" hangingPunct="1">
+                        <a:lnSpc>
+                          <a:spcPct val="100000"/>
+                        </a:lnSpc>
+                        <a:spcBef>
+                          <a:spcPts val="0"/>
+                        </a:spcBef>
+                        <a:spcAft>
+                          <a:spcPts val="0"/>
+                        </a:spcAft>
+                        <a:buClrTx/>
+                        <a:buSzTx/>
+                        <a:buFontTx/>
+                        <a:buNone/>
+                        <a:tabLst/>
+                        <a:defRPr/>
+                      </a:pPr>
+                      <a:r>
+                        <a:rPr lang="en-IN" sz="2000" b="0" dirty="0" smtClean="0">
+                          <a:latin typeface="Cambria" pitchFamily="18" charset="0"/>
+                          <a:ea typeface="Cambria" pitchFamily="18" charset="0"/>
+                        </a:rPr>
+                        <a:t>Not Equals</a:t>
+                      </a:r>
+                      <a:endParaRPr lang="en-US" sz="2000" b="0" dirty="0" smtClean="0">
+                        <a:latin typeface="Cambria" pitchFamily="18" charset="0"/>
+                        <a:ea typeface="Cambria" pitchFamily="18" charset="0"/>
+                      </a:endParaRPr>
+                    </a:p>
+                  </a:txBody>
+                  <a:tcPr anchor="ctr">
+                    <a:lnL w="12700" cap="flat" cmpd="sng" algn="ctr">
+                      <a:solidFill>
+                        <a:schemeClr val="tx1"/>
+                      </a:solidFill>
+                      <a:prstDash val="solid"/>
+                      <a:round/>
+                      <a:headEnd type="none" w="med" len="med"/>
+                      <a:tailEnd type="none" w="med" len="med"/>
+                    </a:lnL>
+                    <a:lnR w="12700" cap="flat" cmpd="sng" algn="ctr">
+                      <a:solidFill>
+                        <a:schemeClr val="tx1"/>
+                      </a:solidFill>
+                      <a:prstDash val="solid"/>
+                      <a:round/>
+                      <a:headEnd type="none" w="med" len="med"/>
+                      <a:tailEnd type="none" w="med" len="med"/>
+                    </a:lnR>
+                    <a:lnT w="12700" cap="flat" cmpd="sng" algn="ctr">
+                      <a:solidFill>
+                        <a:schemeClr val="tx1"/>
+                      </a:solidFill>
+                      <a:prstDash val="solid"/>
+                      <a:round/>
+                      <a:headEnd type="none" w="med" len="med"/>
+                      <a:tailEnd type="none" w="med" len="med"/>
+                    </a:lnT>
+                    <a:lnB w="12700" cap="flat" cmpd="sng" algn="ctr">
+                      <a:solidFill>
+                        <a:schemeClr val="tx1"/>
+                      </a:solidFill>
+                      <a:prstDash val="solid"/>
+                      <a:round/>
+                      <a:headEnd type="none" w="med" len="med"/>
+                      <a:tailEnd type="none" w="med" len="med"/>
+                    </a:lnB>
+                    <a:lnTlToBr w="12700" cmpd="sng">
+                      <a:noFill/>
+                      <a:prstDash val="solid"/>
+                    </a:lnTlToBr>
+                    <a:lnBlToTr w="12700" cmpd="sng">
+                      <a:noFill/>
+                      <a:prstDash val="solid"/>
+                    </a:lnBlToTr>
+                  </a:tcPr>
+                </a:tc>
+              </a:tr>
+            </a:tbl>
+          </a:graphicData>
+        </a:graphic>
+      </p:graphicFrame>
+    </p:spTree>
+  </p:cSld>
+  <p:clrMapOvr>
+    <a:masterClrMapping/>
+  </p:clrMapOvr>
+</p:sld>
+</file>
+
+<file path=ppt/slides/slide6.xml><?xml version="1.0" encoding="utf-8"?>
 <p:sld xmlns:a="http://schemas.openxmlformats.org/drawingml/2006/main" xmlns:r="http://schemas.openxmlformats.org/officeDocument/2006/relationships" xmlns:p="http://schemas.openxmlformats.org/presentationml/2006/main">
   <p:cSld>
     <p:spTree>

</xml_diff>